<commit_message>
Lecture 2: basic HTML structure, tags and some base tags: HTML, HEAD, BODY
</commit_message>
<xml_diff>
--- a/Lecture1/Lecture 1 - Introduction to Web Development.pptx
+++ b/Lecture1/Lecture 1 - Introduction to Web Development.pptx
@@ -111,6 +111,11 @@
       </a:defRPr>
     </a:lvl9pPr>
   </p:defaultTextStyle>
+  <p:extLst>
+    <p:ext uri="{EFAFB233-063F-42B5-8137-9DF3F51BA10A}">
+      <p15:sldGuideLst xmlns:p15="http://schemas.microsoft.com/office/powerpoint/2012/main"/>
+    </p:ext>
+  </p:extLst>
 </p:presentation>
 </file>
 
@@ -261,7 +266,7 @@
           <a:p>
             <a:fld id="{BF1CC74E-D74A-4201-B7DD-8E01FB63B538}" type="datetimeFigureOut">
               <a:rPr lang="en-US" smtClean="0"/>
-              <a:t>9/22/2022</a:t>
+              <a:t>9/23/2022</a:t>
             </a:fld>
             <a:endParaRPr lang="en-US"/>
           </a:p>
@@ -459,7 +464,7 @@
           <a:p>
             <a:fld id="{BF1CC74E-D74A-4201-B7DD-8E01FB63B538}" type="datetimeFigureOut">
               <a:rPr lang="en-US" smtClean="0"/>
-              <a:t>9/22/2022</a:t>
+              <a:t>9/23/2022</a:t>
             </a:fld>
             <a:endParaRPr lang="en-US"/>
           </a:p>
@@ -667,7 +672,7 @@
           <a:p>
             <a:fld id="{BF1CC74E-D74A-4201-B7DD-8E01FB63B538}" type="datetimeFigureOut">
               <a:rPr lang="en-US" smtClean="0"/>
-              <a:t>9/22/2022</a:t>
+              <a:t>9/23/2022</a:t>
             </a:fld>
             <a:endParaRPr lang="en-US"/>
           </a:p>
@@ -865,7 +870,7 @@
           <a:p>
             <a:fld id="{BF1CC74E-D74A-4201-B7DD-8E01FB63B538}" type="datetimeFigureOut">
               <a:rPr lang="en-US" smtClean="0"/>
-              <a:t>9/22/2022</a:t>
+              <a:t>9/23/2022</a:t>
             </a:fld>
             <a:endParaRPr lang="en-US"/>
           </a:p>
@@ -1140,7 +1145,7 @@
           <a:p>
             <a:fld id="{BF1CC74E-D74A-4201-B7DD-8E01FB63B538}" type="datetimeFigureOut">
               <a:rPr lang="en-US" smtClean="0"/>
-              <a:t>9/22/2022</a:t>
+              <a:t>9/23/2022</a:t>
             </a:fld>
             <a:endParaRPr lang="en-US"/>
           </a:p>
@@ -1405,7 +1410,7 @@
           <a:p>
             <a:fld id="{BF1CC74E-D74A-4201-B7DD-8E01FB63B538}" type="datetimeFigureOut">
               <a:rPr lang="en-US" smtClean="0"/>
-              <a:t>9/22/2022</a:t>
+              <a:t>9/23/2022</a:t>
             </a:fld>
             <a:endParaRPr lang="en-US"/>
           </a:p>
@@ -1817,7 +1822,7 @@
           <a:p>
             <a:fld id="{BF1CC74E-D74A-4201-B7DD-8E01FB63B538}" type="datetimeFigureOut">
               <a:rPr lang="en-US" smtClean="0"/>
-              <a:t>9/22/2022</a:t>
+              <a:t>9/23/2022</a:t>
             </a:fld>
             <a:endParaRPr lang="en-US"/>
           </a:p>
@@ -1958,7 +1963,7 @@
           <a:p>
             <a:fld id="{BF1CC74E-D74A-4201-B7DD-8E01FB63B538}" type="datetimeFigureOut">
               <a:rPr lang="en-US" smtClean="0"/>
-              <a:t>9/22/2022</a:t>
+              <a:t>9/23/2022</a:t>
             </a:fld>
             <a:endParaRPr lang="en-US"/>
           </a:p>
@@ -2071,7 +2076,7 @@
           <a:p>
             <a:fld id="{BF1CC74E-D74A-4201-B7DD-8E01FB63B538}" type="datetimeFigureOut">
               <a:rPr lang="en-US" smtClean="0"/>
-              <a:t>9/22/2022</a:t>
+              <a:t>9/23/2022</a:t>
             </a:fld>
             <a:endParaRPr lang="en-US"/>
           </a:p>
@@ -2382,7 +2387,7 @@
           <a:p>
             <a:fld id="{BF1CC74E-D74A-4201-B7DD-8E01FB63B538}" type="datetimeFigureOut">
               <a:rPr lang="en-US" smtClean="0"/>
-              <a:t>9/22/2022</a:t>
+              <a:t>9/23/2022</a:t>
             </a:fld>
             <a:endParaRPr lang="en-US"/>
           </a:p>
@@ -2670,7 +2675,7 @@
           <a:p>
             <a:fld id="{BF1CC74E-D74A-4201-B7DD-8E01FB63B538}" type="datetimeFigureOut">
               <a:rPr lang="en-US" smtClean="0"/>
-              <a:t>9/22/2022</a:t>
+              <a:t>9/23/2022</a:t>
             </a:fld>
             <a:endParaRPr lang="en-US"/>
           </a:p>
@@ -2911,7 +2916,7 @@
           <a:p>
             <a:fld id="{BF1CC74E-D74A-4201-B7DD-8E01FB63B538}" type="datetimeFigureOut">
               <a:rPr lang="en-US" smtClean="0"/>
-              <a:t>9/22/2022</a:t>
+              <a:t>9/23/2022</a:t>
             </a:fld>
             <a:endParaRPr lang="en-US"/>
           </a:p>
@@ -5668,42 +5673,42 @@
             <a:pPr lvl="1"/>
             <a:r>
               <a:rPr lang="en-US" dirty="0"/>
-              <a:t>Mobile apps</a:t>
+              <a:t>Mobile apps – REST API, GRPC</a:t>
             </a:r>
           </a:p>
           <a:p>
             <a:pPr lvl="1"/>
             <a:r>
               <a:rPr lang="en-US" dirty="0"/>
-              <a:t>Email</a:t>
+              <a:t>Email - SMTP</a:t>
             </a:r>
           </a:p>
           <a:p>
             <a:pPr lvl="1"/>
             <a:r>
               <a:rPr lang="en-US" dirty="0"/>
-              <a:t>File sharing</a:t>
+              <a:t>File sharing - FTP</a:t>
             </a:r>
           </a:p>
           <a:p>
             <a:pPr lvl="1"/>
             <a:r>
               <a:rPr lang="en-US" dirty="0"/>
-              <a:t>World wide web</a:t>
+              <a:t>World wide web – TCP/IP, UDP</a:t>
             </a:r>
           </a:p>
           <a:p>
             <a:pPr lvl="1"/>
             <a:r>
               <a:rPr lang="en-US" dirty="0"/>
-              <a:t>Internet telephony</a:t>
+              <a:t>Internet telephony - </a:t>
             </a:r>
           </a:p>
           <a:p>
             <a:pPr lvl="1"/>
             <a:r>
               <a:rPr lang="en-US" dirty="0"/>
-              <a:t>Online multiplayer games</a:t>
+              <a:t>Online multiplayer games – UDP </a:t>
             </a:r>
           </a:p>
           <a:p>
@@ -6896,11 +6901,29 @@
             </a:r>
             <a:r>
               <a:rPr lang="en-US" sz="2000" dirty="0"/>
-              <a:t> </a:t>
-            </a:r>
-            <a:r>
-              <a:rPr lang="en-US" sz="2000"/>
-              <a:t>Markup Language</a:t>
+              <a:t> Markup Language</a:t>
+            </a:r>
+          </a:p>
+          <a:p>
+            <a:pPr lvl="2"/>
+            <a:r>
+              <a:rPr lang="en-US" sz="1600" dirty="0" err="1"/>
+              <a:t>HyperLinks</a:t>
+            </a:r>
+            <a:endParaRPr lang="en-US" sz="1600" dirty="0"/>
+          </a:p>
+          <a:p>
+            <a:pPr lvl="2"/>
+            <a:r>
+              <a:rPr lang="en-US" sz="1600" dirty="0"/>
+              <a:t>Browsers understand how to render it</a:t>
+            </a:r>
+          </a:p>
+          <a:p>
+            <a:pPr lvl="2"/>
+            <a:r>
+              <a:rPr lang="en-US" sz="1600" dirty="0"/>
+              <a:t>Structure</a:t>
             </a:r>
           </a:p>
           <a:p>

</xml_diff>